<commit_message>
finish 2d channel flow
</commit_message>
<xml_diff>
--- a/New Microsoft PowerPoint Presentation.pptx
+++ b/New Microsoft PowerPoint Presentation.pptx
@@ -7,6 +7,7 @@
   <p:sldIdLst>
     <p:sldId id="256" r:id="rId2"/>
     <p:sldId id="257" r:id="rId3"/>
+    <p:sldId id="258" r:id="rId4"/>
   </p:sldIdLst>
   <p:sldSz cx="12192000" cy="6858000"/>
   <p:notesSz cx="6858000" cy="9144000"/>
@@ -262,7 +263,7 @@
           <a:p>
             <a:fld id="{DF8C99C1-FF34-4EE2-AFAB-AF774F0F0F77}" type="datetimeFigureOut">
               <a:rPr lang="en-US" smtClean="0"/>
-              <a:t>12/14/2025</a:t>
+              <a:t>12/23/2025</a:t>
             </a:fld>
             <a:endParaRPr lang="en-US"/>
           </a:p>
@@ -462,7 +463,7 @@
           <a:p>
             <a:fld id="{DF8C99C1-FF34-4EE2-AFAB-AF774F0F0F77}" type="datetimeFigureOut">
               <a:rPr lang="en-US" smtClean="0"/>
-              <a:t>12/14/2025</a:t>
+              <a:t>12/23/2025</a:t>
             </a:fld>
             <a:endParaRPr lang="en-US"/>
           </a:p>
@@ -672,7 +673,7 @@
           <a:p>
             <a:fld id="{DF8C99C1-FF34-4EE2-AFAB-AF774F0F0F77}" type="datetimeFigureOut">
               <a:rPr lang="en-US" smtClean="0"/>
-              <a:t>12/14/2025</a:t>
+              <a:t>12/23/2025</a:t>
             </a:fld>
             <a:endParaRPr lang="en-US"/>
           </a:p>
@@ -872,7 +873,7 @@
           <a:p>
             <a:fld id="{DF8C99C1-FF34-4EE2-AFAB-AF774F0F0F77}" type="datetimeFigureOut">
               <a:rPr lang="en-US" smtClean="0"/>
-              <a:t>12/14/2025</a:t>
+              <a:t>12/23/2025</a:t>
             </a:fld>
             <a:endParaRPr lang="en-US"/>
           </a:p>
@@ -1148,7 +1149,7 @@
           <a:p>
             <a:fld id="{DF8C99C1-FF34-4EE2-AFAB-AF774F0F0F77}" type="datetimeFigureOut">
               <a:rPr lang="en-US" smtClean="0"/>
-              <a:t>12/14/2025</a:t>
+              <a:t>12/23/2025</a:t>
             </a:fld>
             <a:endParaRPr lang="en-US"/>
           </a:p>
@@ -1416,7 +1417,7 @@
           <a:p>
             <a:fld id="{DF8C99C1-FF34-4EE2-AFAB-AF774F0F0F77}" type="datetimeFigureOut">
               <a:rPr lang="en-US" smtClean="0"/>
-              <a:t>12/14/2025</a:t>
+              <a:t>12/23/2025</a:t>
             </a:fld>
             <a:endParaRPr lang="en-US"/>
           </a:p>
@@ -1831,7 +1832,7 @@
           <a:p>
             <a:fld id="{DF8C99C1-FF34-4EE2-AFAB-AF774F0F0F77}" type="datetimeFigureOut">
               <a:rPr lang="en-US" smtClean="0"/>
-              <a:t>12/14/2025</a:t>
+              <a:t>12/23/2025</a:t>
             </a:fld>
             <a:endParaRPr lang="en-US"/>
           </a:p>
@@ -1973,7 +1974,7 @@
           <a:p>
             <a:fld id="{DF8C99C1-FF34-4EE2-AFAB-AF774F0F0F77}" type="datetimeFigureOut">
               <a:rPr lang="en-US" smtClean="0"/>
-              <a:t>12/14/2025</a:t>
+              <a:t>12/23/2025</a:t>
             </a:fld>
             <a:endParaRPr lang="en-US"/>
           </a:p>
@@ -2086,7 +2087,7 @@
           <a:p>
             <a:fld id="{DF8C99C1-FF34-4EE2-AFAB-AF774F0F0F77}" type="datetimeFigureOut">
               <a:rPr lang="en-US" smtClean="0"/>
-              <a:t>12/14/2025</a:t>
+              <a:t>12/23/2025</a:t>
             </a:fld>
             <a:endParaRPr lang="en-US"/>
           </a:p>
@@ -2399,7 +2400,7 @@
           <a:p>
             <a:fld id="{DF8C99C1-FF34-4EE2-AFAB-AF774F0F0F77}" type="datetimeFigureOut">
               <a:rPr lang="en-US" smtClean="0"/>
-              <a:t>12/14/2025</a:t>
+              <a:t>12/23/2025</a:t>
             </a:fld>
             <a:endParaRPr lang="en-US"/>
           </a:p>
@@ -2688,7 +2689,7 @@
           <a:p>
             <a:fld id="{DF8C99C1-FF34-4EE2-AFAB-AF774F0F0F77}" type="datetimeFigureOut">
               <a:rPr lang="en-US" smtClean="0"/>
-              <a:t>12/14/2025</a:t>
+              <a:t>12/23/2025</a:t>
             </a:fld>
             <a:endParaRPr lang="en-US"/>
           </a:p>
@@ -2931,7 +2932,7 @@
           <a:p>
             <a:fld id="{DF8C99C1-FF34-4EE2-AFAB-AF774F0F0F77}" type="datetimeFigureOut">
               <a:rPr lang="en-US" smtClean="0"/>
-              <a:t>12/14/2025</a:t>
+              <a:t>12/23/2025</a:t>
             </a:fld>
             <a:endParaRPr lang="en-US"/>
           </a:p>
@@ -3869,8 +3870,8 @@
           </a:fontRef>
         </p:style>
       </p:cxnSp>
-      <mc:AlternateContent xmlns:mc="http://schemas.openxmlformats.org/markup-compatibility/2006">
-        <mc:Choice xmlns:a14="http://schemas.microsoft.com/office/drawing/2010/main" Requires="a14">
+      <mc:AlternateContent xmlns:mc="http://schemas.openxmlformats.org/markup-compatibility/2006" xmlns:a14="http://schemas.microsoft.com/office/drawing/2010/main">
+        <mc:Choice Requires="a14">
           <p:sp>
             <p:nvSpPr>
               <p:cNvPr id="21" name="文本框 20">
@@ -3899,6 +3900,7 @@
               </a:bodyPr>
               <a:lstStyle/>
               <a:p>
+                <a:pPr/>
                 <a14:m>
                   <m:oMathPara xmlns:m="http://schemas.openxmlformats.org/officeDocument/2006/math">
                     <m:oMathParaPr>
@@ -3952,7 +3954,7 @@
             </p:txBody>
           </p:sp>
         </mc:Choice>
-        <mc:Fallback>
+        <mc:Fallback xmlns="">
           <p:sp>
             <p:nvSpPr>
               <p:cNvPr id="21" name="文本框 20">
@@ -3997,8 +3999,8 @@
           </p:sp>
         </mc:Fallback>
       </mc:AlternateContent>
-      <mc:AlternateContent xmlns:mc="http://schemas.openxmlformats.org/markup-compatibility/2006">
-        <mc:Choice xmlns:a14="http://schemas.microsoft.com/office/drawing/2010/main" Requires="a14">
+      <mc:AlternateContent xmlns:mc="http://schemas.openxmlformats.org/markup-compatibility/2006" xmlns:a14="http://schemas.microsoft.com/office/drawing/2010/main">
+        <mc:Choice Requires="a14">
           <p:sp>
             <p:nvSpPr>
               <p:cNvPr id="22" name="文本框 21">
@@ -4027,6 +4029,7 @@
               </a:bodyPr>
               <a:lstStyle/>
               <a:p>
+                <a:pPr/>
                 <a14:m>
                   <m:oMathPara xmlns:m="http://schemas.openxmlformats.org/officeDocument/2006/math">
                     <m:oMathParaPr>
@@ -4080,7 +4083,7 @@
             </p:txBody>
           </p:sp>
         </mc:Choice>
-        <mc:Fallback>
+        <mc:Fallback xmlns="">
           <p:sp>
             <p:nvSpPr>
               <p:cNvPr id="22" name="文本框 21">
@@ -4289,8 +4292,8 @@
           </a:fontRef>
         </p:style>
       </p:cxnSp>
-      <mc:AlternateContent xmlns:mc="http://schemas.openxmlformats.org/markup-compatibility/2006">
-        <mc:Choice xmlns:a14="http://schemas.microsoft.com/office/drawing/2010/main" Requires="a14">
+      <mc:AlternateContent xmlns:mc="http://schemas.openxmlformats.org/markup-compatibility/2006" xmlns:a14="http://schemas.microsoft.com/office/drawing/2010/main">
+        <mc:Choice Requires="a14">
           <p:sp>
             <p:nvSpPr>
               <p:cNvPr id="29" name="文本框 28">
@@ -4319,6 +4322,7 @@
               </a:bodyPr>
               <a:lstStyle/>
               <a:p>
+                <a:pPr/>
                 <a14:m>
                   <m:oMathPara xmlns:m="http://schemas.openxmlformats.org/officeDocument/2006/math">
                     <m:oMathParaPr>
@@ -4372,7 +4376,7 @@
             </p:txBody>
           </p:sp>
         </mc:Choice>
-        <mc:Fallback>
+        <mc:Fallback xmlns="">
           <p:sp>
             <p:nvSpPr>
               <p:cNvPr id="29" name="文本框 28">
@@ -4417,8 +4421,8 @@
           </p:sp>
         </mc:Fallback>
       </mc:AlternateContent>
-      <mc:AlternateContent xmlns:mc="http://schemas.openxmlformats.org/markup-compatibility/2006">
-        <mc:Choice xmlns:a14="http://schemas.microsoft.com/office/drawing/2010/main" Requires="a14">
+      <mc:AlternateContent xmlns:mc="http://schemas.openxmlformats.org/markup-compatibility/2006" xmlns:a14="http://schemas.microsoft.com/office/drawing/2010/main">
+        <mc:Choice Requires="a14">
           <p:sp>
             <p:nvSpPr>
               <p:cNvPr id="30" name="文本框 29">
@@ -4447,6 +4451,7 @@
               </a:bodyPr>
               <a:lstStyle/>
               <a:p>
+                <a:pPr/>
                 <a14:m>
                   <m:oMathPara xmlns:m="http://schemas.openxmlformats.org/officeDocument/2006/math">
                     <m:oMathParaPr>
@@ -4500,7 +4505,7 @@
             </p:txBody>
           </p:sp>
         </mc:Choice>
-        <mc:Fallback>
+        <mc:Fallback xmlns="">
           <p:sp>
             <p:nvSpPr>
               <p:cNvPr id="30" name="文本框 29">
@@ -4545,8 +4550,8 @@
           </p:sp>
         </mc:Fallback>
       </mc:AlternateContent>
-      <mc:AlternateContent xmlns:mc="http://schemas.openxmlformats.org/markup-compatibility/2006">
-        <mc:Choice xmlns:a14="http://schemas.microsoft.com/office/drawing/2010/main" Requires="a14">
+      <mc:AlternateContent xmlns:mc="http://schemas.openxmlformats.org/markup-compatibility/2006" xmlns:a14="http://schemas.microsoft.com/office/drawing/2010/main">
+        <mc:Choice Requires="a14">
           <p:sp>
             <p:nvSpPr>
               <p:cNvPr id="31" name="文本框 30">
@@ -4575,6 +4580,7 @@
               </a:bodyPr>
               <a:lstStyle/>
               <a:p>
+                <a:pPr/>
                 <a14:m>
                   <m:oMathPara xmlns:m="http://schemas.openxmlformats.org/officeDocument/2006/math">
                     <m:oMathParaPr>
@@ -4628,7 +4634,7 @@
             </p:txBody>
           </p:sp>
         </mc:Choice>
-        <mc:Fallback>
+        <mc:Fallback xmlns="">
           <p:sp>
             <p:nvSpPr>
               <p:cNvPr id="31" name="文本框 30">
@@ -4673,8 +4679,8 @@
           </p:sp>
         </mc:Fallback>
       </mc:AlternateContent>
-      <mc:AlternateContent xmlns:mc="http://schemas.openxmlformats.org/markup-compatibility/2006">
-        <mc:Choice xmlns:a14="http://schemas.microsoft.com/office/drawing/2010/main" Requires="a14">
+      <mc:AlternateContent xmlns:mc="http://schemas.openxmlformats.org/markup-compatibility/2006" xmlns:a14="http://schemas.microsoft.com/office/drawing/2010/main">
+        <mc:Choice Requires="a14">
           <p:sp>
             <p:nvSpPr>
               <p:cNvPr id="32" name="文本框 31">
@@ -4703,6 +4709,7 @@
               </a:bodyPr>
               <a:lstStyle/>
               <a:p>
+                <a:pPr/>
                 <a14:m>
                   <m:oMathPara xmlns:m="http://schemas.openxmlformats.org/officeDocument/2006/math">
                     <m:oMathParaPr>
@@ -4756,7 +4763,7 @@
             </p:txBody>
           </p:sp>
         </mc:Choice>
-        <mc:Fallback>
+        <mc:Fallback xmlns="">
           <p:sp>
             <p:nvSpPr>
               <p:cNvPr id="32" name="文本框 31">
@@ -4883,8 +4890,8 @@
           </a:fontRef>
         </p:style>
       </p:cxnSp>
-      <mc:AlternateContent xmlns:mc="http://schemas.openxmlformats.org/markup-compatibility/2006">
-        <mc:Choice xmlns:a14="http://schemas.microsoft.com/office/drawing/2010/main" Requires="a14">
+      <mc:AlternateContent xmlns:mc="http://schemas.openxmlformats.org/markup-compatibility/2006" xmlns:a14="http://schemas.microsoft.com/office/drawing/2010/main">
+        <mc:Choice Requires="a14">
           <p:sp>
             <p:nvSpPr>
               <p:cNvPr id="36" name="文本框 35">
@@ -4913,6 +4920,7 @@
               </a:bodyPr>
               <a:lstStyle/>
               <a:p>
+                <a:pPr/>
                 <a14:m>
                   <m:oMathPara xmlns:m="http://schemas.openxmlformats.org/officeDocument/2006/math">
                     <m:oMathParaPr>
@@ -4966,7 +4974,7 @@
             </p:txBody>
           </p:sp>
         </mc:Choice>
-        <mc:Fallback>
+        <mc:Fallback xmlns="">
           <p:sp>
             <p:nvSpPr>
               <p:cNvPr id="36" name="文本框 35">
@@ -5011,8 +5019,8 @@
           </p:sp>
         </mc:Fallback>
       </mc:AlternateContent>
-      <mc:AlternateContent xmlns:mc="http://schemas.openxmlformats.org/markup-compatibility/2006">
-        <mc:Choice xmlns:a14="http://schemas.microsoft.com/office/drawing/2010/main" Requires="a14">
+      <mc:AlternateContent xmlns:mc="http://schemas.openxmlformats.org/markup-compatibility/2006" xmlns:a14="http://schemas.microsoft.com/office/drawing/2010/main">
+        <mc:Choice Requires="a14">
           <p:sp>
             <p:nvSpPr>
               <p:cNvPr id="37" name="文本框 36">
@@ -5041,6 +5049,7 @@
               </a:bodyPr>
               <a:lstStyle/>
               <a:p>
+                <a:pPr/>
                 <a14:m>
                   <m:oMathPara xmlns:m="http://schemas.openxmlformats.org/officeDocument/2006/math">
                     <m:oMathParaPr>
@@ -5094,7 +5103,7 @@
             </p:txBody>
           </p:sp>
         </mc:Choice>
-        <mc:Fallback>
+        <mc:Fallback xmlns="">
           <p:sp>
             <p:nvSpPr>
               <p:cNvPr id="37" name="文本框 36">
@@ -5303,8 +5312,8 @@
           </a:fontRef>
         </p:style>
       </p:cxnSp>
-      <mc:AlternateContent xmlns:mc="http://schemas.openxmlformats.org/markup-compatibility/2006">
-        <mc:Choice xmlns:a14="http://schemas.microsoft.com/office/drawing/2010/main" Requires="a14">
+      <mc:AlternateContent xmlns:mc="http://schemas.openxmlformats.org/markup-compatibility/2006" xmlns:a14="http://schemas.microsoft.com/office/drawing/2010/main">
+        <mc:Choice Requires="a14">
           <p:sp>
             <p:nvSpPr>
               <p:cNvPr id="42" name="文本框 41">
@@ -5333,6 +5342,7 @@
               </a:bodyPr>
               <a:lstStyle/>
               <a:p>
+                <a:pPr/>
                 <a14:m>
                   <m:oMathPara xmlns:m="http://schemas.openxmlformats.org/officeDocument/2006/math">
                     <m:oMathParaPr>
@@ -5386,7 +5396,7 @@
             </p:txBody>
           </p:sp>
         </mc:Choice>
-        <mc:Fallback>
+        <mc:Fallback xmlns="">
           <p:sp>
             <p:nvSpPr>
               <p:cNvPr id="42" name="文本框 41">
@@ -5431,8 +5441,8 @@
           </p:sp>
         </mc:Fallback>
       </mc:AlternateContent>
-      <mc:AlternateContent xmlns:mc="http://schemas.openxmlformats.org/markup-compatibility/2006">
-        <mc:Choice xmlns:a14="http://schemas.microsoft.com/office/drawing/2010/main" Requires="a14">
+      <mc:AlternateContent xmlns:mc="http://schemas.openxmlformats.org/markup-compatibility/2006" xmlns:a14="http://schemas.microsoft.com/office/drawing/2010/main">
+        <mc:Choice Requires="a14">
           <p:sp>
             <p:nvSpPr>
               <p:cNvPr id="43" name="文本框 42">
@@ -5461,6 +5471,7 @@
               </a:bodyPr>
               <a:lstStyle/>
               <a:p>
+                <a:pPr/>
                 <a14:m>
                   <m:oMathPara xmlns:m="http://schemas.openxmlformats.org/officeDocument/2006/math">
                     <m:oMathParaPr>
@@ -5514,7 +5525,7 @@
             </p:txBody>
           </p:sp>
         </mc:Choice>
-        <mc:Fallback>
+        <mc:Fallback xmlns="">
           <p:sp>
             <p:nvSpPr>
               <p:cNvPr id="43" name="文本框 42">
@@ -5559,8 +5570,8 @@
           </p:sp>
         </mc:Fallback>
       </mc:AlternateContent>
-      <mc:AlternateContent xmlns:mc="http://schemas.openxmlformats.org/markup-compatibility/2006">
-        <mc:Choice xmlns:a14="http://schemas.microsoft.com/office/drawing/2010/main" Requires="a14">
+      <mc:AlternateContent xmlns:mc="http://schemas.openxmlformats.org/markup-compatibility/2006" xmlns:a14="http://schemas.microsoft.com/office/drawing/2010/main">
+        <mc:Choice Requires="a14">
           <p:sp>
             <p:nvSpPr>
               <p:cNvPr id="44" name="文本框 43">
@@ -5589,6 +5600,7 @@
               </a:bodyPr>
               <a:lstStyle/>
               <a:p>
+                <a:pPr/>
                 <a14:m>
                   <m:oMathPara xmlns:m="http://schemas.openxmlformats.org/officeDocument/2006/math">
                     <m:oMathParaPr>
@@ -5642,7 +5654,7 @@
             </p:txBody>
           </p:sp>
         </mc:Choice>
-        <mc:Fallback>
+        <mc:Fallback xmlns="">
           <p:sp>
             <p:nvSpPr>
               <p:cNvPr id="44" name="文本框 43">
@@ -5687,8 +5699,8 @@
           </p:sp>
         </mc:Fallback>
       </mc:AlternateContent>
-      <mc:AlternateContent xmlns:mc="http://schemas.openxmlformats.org/markup-compatibility/2006">
-        <mc:Choice xmlns:a14="http://schemas.microsoft.com/office/drawing/2010/main" Requires="a14">
+      <mc:AlternateContent xmlns:mc="http://schemas.openxmlformats.org/markup-compatibility/2006" xmlns:a14="http://schemas.microsoft.com/office/drawing/2010/main">
+        <mc:Choice Requires="a14">
           <p:sp>
             <p:nvSpPr>
               <p:cNvPr id="45" name="文本框 44">
@@ -5717,6 +5729,7 @@
               </a:bodyPr>
               <a:lstStyle/>
               <a:p>
+                <a:pPr/>
                 <a14:m>
                   <m:oMathPara xmlns:m="http://schemas.openxmlformats.org/officeDocument/2006/math">
                     <m:oMathParaPr>
@@ -5770,7 +5783,7 @@
             </p:txBody>
           </p:sp>
         </mc:Choice>
-        <mc:Fallback>
+        <mc:Fallback xmlns="">
           <p:sp>
             <p:nvSpPr>
               <p:cNvPr id="45" name="文本框 44">
@@ -5906,6 +5919,96 @@
     <p:extLst>
       <p:ext uri="{BB962C8B-B14F-4D97-AF65-F5344CB8AC3E}">
         <p14:creationId xmlns:p14="http://schemas.microsoft.com/office/powerpoint/2010/main" val="1328084362"/>
+      </p:ext>
+    </p:extLst>
+  </p:cSld>
+  <p:clrMapOvr>
+    <a:masterClrMapping/>
+  </p:clrMapOvr>
+</p:sld>
+</file>
+
+<file path=ppt/slides/slide3.xml><?xml version="1.0" encoding="utf-8"?>
+<p:sld xmlns:a="http://schemas.openxmlformats.org/drawingml/2006/main" xmlns:r="http://schemas.openxmlformats.org/officeDocument/2006/relationships" xmlns:p="http://schemas.openxmlformats.org/presentationml/2006/main">
+  <p:cSld>
+    <p:spTree>
+      <p:nvGrpSpPr>
+        <p:cNvPr id="1" name=""/>
+        <p:cNvGrpSpPr/>
+        <p:nvPr/>
+      </p:nvGrpSpPr>
+      <p:grpSpPr>
+        <a:xfrm>
+          <a:off x="0" y="0"/>
+          <a:ext cx="0" cy="0"/>
+          <a:chOff x="0" y="0"/>
+          <a:chExt cx="0" cy="0"/>
+        </a:xfrm>
+      </p:grpSpPr>
+      <p:pic>
+        <p:nvPicPr>
+          <p:cNvPr id="9" name="Picture 8">
+            <a:extLst>
+              <a:ext uri="{FF2B5EF4-FFF2-40B4-BE49-F238E27FC236}">
+                <a16:creationId xmlns:a16="http://schemas.microsoft.com/office/drawing/2014/main" id="{FCDEEBF7-FF76-7AFB-7860-AE9AB64275A9}"/>
+              </a:ext>
+            </a:extLst>
+          </p:cNvPr>
+          <p:cNvPicPr>
+            <a:picLocks noChangeAspect="1"/>
+          </p:cNvPicPr>
+          <p:nvPr/>
+        </p:nvPicPr>
+        <p:blipFill>
+          <a:blip r:embed="rId2"/>
+          <a:stretch>
+            <a:fillRect/>
+          </a:stretch>
+        </p:blipFill>
+        <p:spPr>
+          <a:xfrm>
+            <a:off x="1209328" y="3510874"/>
+            <a:ext cx="9192908" cy="2981741"/>
+          </a:xfrm>
+          <a:prstGeom prst="rect">
+            <a:avLst/>
+          </a:prstGeom>
+        </p:spPr>
+      </p:pic>
+      <p:pic>
+        <p:nvPicPr>
+          <p:cNvPr id="11" name="Picture 10">
+            <a:extLst>
+              <a:ext uri="{FF2B5EF4-FFF2-40B4-BE49-F238E27FC236}">
+                <a16:creationId xmlns:a16="http://schemas.microsoft.com/office/drawing/2014/main" id="{764A84C4-CAA1-0CE3-4FC5-0CA0997D3A63}"/>
+              </a:ext>
+            </a:extLst>
+          </p:cNvPr>
+          <p:cNvPicPr>
+            <a:picLocks noChangeAspect="1"/>
+          </p:cNvPicPr>
+          <p:nvPr/>
+        </p:nvPicPr>
+        <p:blipFill>
+          <a:blip r:embed="rId3"/>
+          <a:stretch>
+            <a:fillRect/>
+          </a:stretch>
+        </p:blipFill>
+        <p:spPr>
+          <a:xfrm>
+            <a:off x="1190275" y="776817"/>
+            <a:ext cx="9211961" cy="2734057"/>
+          </a:xfrm>
+          <a:prstGeom prst="rect">
+            <a:avLst/>
+          </a:prstGeom>
+        </p:spPr>
+      </p:pic>
+    </p:spTree>
+    <p:extLst>
+      <p:ext uri="{BB962C8B-B14F-4D97-AF65-F5344CB8AC3E}">
+        <p14:creationId xmlns:p14="http://schemas.microsoft.com/office/powerpoint/2010/main" val="1712282865"/>
       </p:ext>
     </p:extLst>
   </p:cSld>

</xml_diff>